<commit_message>
Adición de metodología en el informe
</commit_message>
<xml_diff>
--- a/Informe_Salida/Vibrio_Muestreo.pptx
+++ b/Informe_Salida/Vibrio_Muestreo.pptx
@@ -5,10 +5,11 @@
     <p:sldMasterId id="2147483684" r:id="rId1"/>
   </p:sldMasterIdLst>
   <p:notesMasterIdLst>
-    <p:notesMasterId r:id="rId3"/>
+    <p:notesMasterId r:id="rId4"/>
   </p:notesMasterIdLst>
   <p:sldIdLst>
     <p:sldId id="256" r:id="rId2"/>
+    <p:sldId id="257" r:id="rId3"/>
   </p:sldIdLst>
   <p:sldSz cx="6858000" cy="7199313"/>
   <p:notesSz cx="6858000" cy="9144000"/>
@@ -208,7 +209,7 @@
           <a:p>
             <a:fld id="{36878888-53B4-4462-829B-3CA5558D2B80}" type="datetimeFigureOut">
               <a:rPr lang="es-CO" smtClean="0"/>
-              <a:t>25/04/2023</a:t>
+              <a:t>27/04/2023</a:t>
             </a:fld>
             <a:endParaRPr lang="es-CO"/>
           </a:p>
@@ -560,6 +561,90 @@
 </p:notes>
 </file>
 
+<file path=ppt/notesSlides/notesSlide2.xml><?xml version="1.0" encoding="utf-8"?>
+<p:notes xmlns:a="http://schemas.openxmlformats.org/drawingml/2006/main" xmlns:r="http://schemas.openxmlformats.org/officeDocument/2006/relationships" xmlns:p="http://schemas.openxmlformats.org/presentationml/2006/main">
+  <p:cSld>
+    <p:spTree>
+      <p:nvGrpSpPr>
+        <p:cNvPr id="1" name=""/>
+        <p:cNvGrpSpPr/>
+        <p:nvPr/>
+      </p:nvGrpSpPr>
+      <p:grpSpPr>
+        <a:xfrm>
+          <a:off x="0" y="0"/>
+          <a:ext cx="0" cy="0"/>
+          <a:chOff x="0" y="0"/>
+          <a:chExt cx="0" cy="0"/>
+        </a:xfrm>
+      </p:grpSpPr>
+      <p:sp>
+        <p:nvSpPr>
+          <p:cNvPr id="2" name="Marcador de imagen de diapositiva 1"/>
+          <p:cNvSpPr>
+            <a:spLocks noGrp="1" noRot="1" noChangeAspect="1"/>
+          </p:cNvSpPr>
+          <p:nvPr>
+            <p:ph type="sldImg"/>
+          </p:nvPr>
+        </p:nvSpPr>
+        <p:spPr/>
+      </p:sp>
+      <p:sp>
+        <p:nvSpPr>
+          <p:cNvPr id="3" name="Marcador de notas 2"/>
+          <p:cNvSpPr>
+            <a:spLocks noGrp="1"/>
+          </p:cNvSpPr>
+          <p:nvPr>
+            <p:ph type="body" idx="1"/>
+          </p:nvPr>
+        </p:nvSpPr>
+        <p:spPr/>
+        <p:txBody>
+          <a:bodyPr/>
+          <a:lstStyle/>
+          <a:p>
+            <a:endParaRPr lang="es-CO" dirty="0"/>
+          </a:p>
+        </p:txBody>
+      </p:sp>
+      <p:sp>
+        <p:nvSpPr>
+          <p:cNvPr id="4" name="Marcador de número de diapositiva 3"/>
+          <p:cNvSpPr>
+            <a:spLocks noGrp="1"/>
+          </p:cNvSpPr>
+          <p:nvPr>
+            <p:ph type="sldNum" sz="quarter" idx="5"/>
+          </p:nvPr>
+        </p:nvSpPr>
+        <p:spPr/>
+        <p:txBody>
+          <a:bodyPr/>
+          <a:lstStyle/>
+          <a:p>
+            <a:fld id="{C2B69F68-1DDD-44F2-ADC8-F17154F8862A}" type="slidenum">
+              <a:rPr lang="es-CO" smtClean="0"/>
+              <a:t>2</a:t>
+            </a:fld>
+            <a:endParaRPr lang="es-CO"/>
+          </a:p>
+        </p:txBody>
+      </p:sp>
+    </p:spTree>
+    <p:extLst>
+      <p:ext uri="{BB962C8B-B14F-4D97-AF65-F5344CB8AC3E}">
+        <p14:creationId xmlns:p14="http://schemas.microsoft.com/office/powerpoint/2010/main" val="2873900097"/>
+      </p:ext>
+    </p:extLst>
+  </p:cSld>
+  <p:clrMapOvr>
+    <a:masterClrMapping/>
+  </p:clrMapOvr>
+</p:notes>
+</file>
+
 <file path=ppt/slideLayouts/slideLayout1.xml><?xml version="1.0" encoding="utf-8"?>
 <p:sldLayout xmlns:a="http://schemas.openxmlformats.org/drawingml/2006/main" xmlns:r="http://schemas.openxmlformats.org/officeDocument/2006/relationships" xmlns:p="http://schemas.openxmlformats.org/presentationml/2006/main" type="title" preserve="1">
   <p:cSld name="Diapositiva de título">
@@ -691,7 +776,7 @@
           <a:p>
             <a:fld id="{5458A15F-2B26-4621-9E2C-39F533E3EEDD}" type="datetimeFigureOut">
               <a:rPr lang="es-CO" smtClean="0"/>
-              <a:t>25/04/2023</a:t>
+              <a:t>27/04/2023</a:t>
             </a:fld>
             <a:endParaRPr lang="es-CO"/>
           </a:p>
@@ -861,7 +946,7 @@
           <a:p>
             <a:fld id="{5458A15F-2B26-4621-9E2C-39F533E3EEDD}" type="datetimeFigureOut">
               <a:rPr lang="es-CO" smtClean="0"/>
-              <a:t>25/04/2023</a:t>
+              <a:t>27/04/2023</a:t>
             </a:fld>
             <a:endParaRPr lang="es-CO"/>
           </a:p>
@@ -1041,7 +1126,7 @@
           <a:p>
             <a:fld id="{5458A15F-2B26-4621-9E2C-39F533E3EEDD}" type="datetimeFigureOut">
               <a:rPr lang="es-CO" smtClean="0"/>
-              <a:t>25/04/2023</a:t>
+              <a:t>27/04/2023</a:t>
             </a:fld>
             <a:endParaRPr lang="es-CO"/>
           </a:p>
@@ -1211,7 +1296,7 @@
           <a:p>
             <a:fld id="{5458A15F-2B26-4621-9E2C-39F533E3EEDD}" type="datetimeFigureOut">
               <a:rPr lang="es-CO" smtClean="0"/>
-              <a:t>25/04/2023</a:t>
+              <a:t>27/04/2023</a:t>
             </a:fld>
             <a:endParaRPr lang="es-CO"/>
           </a:p>
@@ -1455,7 +1540,7 @@
           <a:p>
             <a:fld id="{5458A15F-2B26-4621-9E2C-39F533E3EEDD}" type="datetimeFigureOut">
               <a:rPr lang="es-CO" smtClean="0"/>
-              <a:t>25/04/2023</a:t>
+              <a:t>27/04/2023</a:t>
             </a:fld>
             <a:endParaRPr lang="es-CO"/>
           </a:p>
@@ -1687,7 +1772,7 @@
           <a:p>
             <a:fld id="{5458A15F-2B26-4621-9E2C-39F533E3EEDD}" type="datetimeFigureOut">
               <a:rPr lang="es-CO" smtClean="0"/>
-              <a:t>25/04/2023</a:t>
+              <a:t>27/04/2023</a:t>
             </a:fld>
             <a:endParaRPr lang="es-CO"/>
           </a:p>
@@ -2054,7 +2139,7 @@
           <a:p>
             <a:fld id="{5458A15F-2B26-4621-9E2C-39F533E3EEDD}" type="datetimeFigureOut">
               <a:rPr lang="es-CO" smtClean="0"/>
-              <a:t>25/04/2023</a:t>
+              <a:t>27/04/2023</a:t>
             </a:fld>
             <a:endParaRPr lang="es-CO"/>
           </a:p>
@@ -2172,7 +2257,7 @@
           <a:p>
             <a:fld id="{5458A15F-2B26-4621-9E2C-39F533E3EEDD}" type="datetimeFigureOut">
               <a:rPr lang="es-CO" smtClean="0"/>
-              <a:t>25/04/2023</a:t>
+              <a:t>27/04/2023</a:t>
             </a:fld>
             <a:endParaRPr lang="es-CO"/>
           </a:p>
@@ -2267,7 +2352,7 @@
           <a:p>
             <a:fld id="{5458A15F-2B26-4621-9E2C-39F533E3EEDD}" type="datetimeFigureOut">
               <a:rPr lang="es-CO" smtClean="0"/>
-              <a:t>25/04/2023</a:t>
+              <a:t>27/04/2023</a:t>
             </a:fld>
             <a:endParaRPr lang="es-CO"/>
           </a:p>
@@ -2544,7 +2629,7 @@
           <a:p>
             <a:fld id="{5458A15F-2B26-4621-9E2C-39F533E3EEDD}" type="datetimeFigureOut">
               <a:rPr lang="es-CO" smtClean="0"/>
-              <a:t>25/04/2023</a:t>
+              <a:t>27/04/2023</a:t>
             </a:fld>
             <a:endParaRPr lang="es-CO"/>
           </a:p>
@@ -2801,7 +2886,7 @@
           <a:p>
             <a:fld id="{5458A15F-2B26-4621-9E2C-39F533E3EEDD}" type="datetimeFigureOut">
               <a:rPr lang="es-CO" smtClean="0"/>
-              <a:t>25/04/2023</a:t>
+              <a:t>27/04/2023</a:t>
             </a:fld>
             <a:endParaRPr lang="es-CO"/>
           </a:p>
@@ -3014,7 +3099,7 @@
           <a:p>
             <a:fld id="{5458A15F-2B26-4621-9E2C-39F533E3EEDD}" type="datetimeFigureOut">
               <a:rPr lang="es-CO" smtClean="0"/>
-              <a:t>25/04/2023</a:t>
+              <a:t>27/04/2023</a:t>
             </a:fld>
             <a:endParaRPr lang="es-CO"/>
           </a:p>
@@ -3751,6 +3836,318 @@
     <p:extLst>
       <p:ext uri="{BB962C8B-B14F-4D97-AF65-F5344CB8AC3E}">
         <p14:creationId xmlns:p14="http://schemas.microsoft.com/office/powerpoint/2010/main" val="70356586"/>
+      </p:ext>
+    </p:extLst>
+  </p:cSld>
+  <p:clrMapOvr>
+    <a:masterClrMapping/>
+  </p:clrMapOvr>
+</p:sld>
+</file>
+
+<file path=ppt/slides/slide2.xml><?xml version="1.0" encoding="utf-8"?>
+<p:sld xmlns:a="http://schemas.openxmlformats.org/drawingml/2006/main" xmlns:r="http://schemas.openxmlformats.org/officeDocument/2006/relationships" xmlns:p="http://schemas.openxmlformats.org/presentationml/2006/main">
+  <p:cSld>
+    <p:spTree>
+      <p:nvGrpSpPr>
+        <p:cNvPr id="1" name=""/>
+        <p:cNvGrpSpPr/>
+        <p:nvPr/>
+      </p:nvGrpSpPr>
+      <p:grpSpPr>
+        <a:xfrm>
+          <a:off x="0" y="0"/>
+          <a:ext cx="0" cy="0"/>
+          <a:chOff x="0" y="0"/>
+          <a:chExt cx="0" cy="0"/>
+        </a:xfrm>
+      </p:grpSpPr>
+      <p:sp>
+        <p:nvSpPr>
+          <p:cNvPr id="13" name="CuadroTexto 12">
+            <a:extLst>
+              <a:ext uri="{FF2B5EF4-FFF2-40B4-BE49-F238E27FC236}">
+                <a16:creationId xmlns:a16="http://schemas.microsoft.com/office/drawing/2014/main" id="{DB239702-BEE7-A2EB-5968-2B43315B7929}"/>
+              </a:ext>
+            </a:extLst>
+          </p:cNvPr>
+          <p:cNvSpPr txBox="1"/>
+          <p:nvPr/>
+        </p:nvSpPr>
+        <p:spPr>
+          <a:xfrm>
+            <a:off x="207334" y="-31979"/>
+            <a:ext cx="489352" cy="369332"/>
+          </a:xfrm>
+          <a:prstGeom prst="rect">
+            <a:avLst/>
+          </a:prstGeom>
+          <a:noFill/>
+        </p:spPr>
+        <p:txBody>
+          <a:bodyPr wrap="square">
+            <a:spAutoFit/>
+          </a:bodyPr>
+          <a:lstStyle/>
+          <a:p>
+            <a:r>
+              <a:rPr lang="es-ES" b="1" dirty="0"/>
+              <a:t>A.</a:t>
+            </a:r>
+            <a:endParaRPr lang="es-CO" b="1" dirty="0"/>
+          </a:p>
+        </p:txBody>
+      </p:sp>
+      <p:sp>
+        <p:nvSpPr>
+          <p:cNvPr id="14" name="CuadroTexto 13">
+            <a:extLst>
+              <a:ext uri="{FF2B5EF4-FFF2-40B4-BE49-F238E27FC236}">
+                <a16:creationId xmlns:a16="http://schemas.microsoft.com/office/drawing/2014/main" id="{091166F2-AD30-1213-A5D5-C6BE8F65ECFB}"/>
+              </a:ext>
+            </a:extLst>
+          </p:cNvPr>
+          <p:cNvSpPr txBox="1"/>
+          <p:nvPr/>
+        </p:nvSpPr>
+        <p:spPr>
+          <a:xfrm>
+            <a:off x="3429000" y="-33495"/>
+            <a:ext cx="489352" cy="369332"/>
+          </a:xfrm>
+          <a:prstGeom prst="rect">
+            <a:avLst/>
+          </a:prstGeom>
+          <a:noFill/>
+        </p:spPr>
+        <p:txBody>
+          <a:bodyPr wrap="square">
+            <a:spAutoFit/>
+          </a:bodyPr>
+          <a:lstStyle/>
+          <a:p>
+            <a:r>
+              <a:rPr lang="es-ES" b="1" dirty="0"/>
+              <a:t>B.</a:t>
+            </a:r>
+            <a:endParaRPr lang="es-CO" b="1" dirty="0"/>
+          </a:p>
+        </p:txBody>
+      </p:sp>
+      <p:sp>
+        <p:nvSpPr>
+          <p:cNvPr id="15" name="CuadroTexto 14">
+            <a:extLst>
+              <a:ext uri="{FF2B5EF4-FFF2-40B4-BE49-F238E27FC236}">
+                <a16:creationId xmlns:a16="http://schemas.microsoft.com/office/drawing/2014/main" id="{4976A117-7F98-23C0-2591-8052377AEFD1}"/>
+              </a:ext>
+            </a:extLst>
+          </p:cNvPr>
+          <p:cNvSpPr txBox="1"/>
+          <p:nvPr/>
+        </p:nvSpPr>
+        <p:spPr>
+          <a:xfrm>
+            <a:off x="218341" y="2621613"/>
+            <a:ext cx="489352" cy="369332"/>
+          </a:xfrm>
+          <a:prstGeom prst="rect">
+            <a:avLst/>
+          </a:prstGeom>
+          <a:noFill/>
+        </p:spPr>
+        <p:txBody>
+          <a:bodyPr wrap="square">
+            <a:spAutoFit/>
+          </a:bodyPr>
+          <a:lstStyle/>
+          <a:p>
+            <a:r>
+              <a:rPr lang="es-ES" b="1" dirty="0"/>
+              <a:t>C.</a:t>
+            </a:r>
+            <a:endParaRPr lang="es-CO" b="1" dirty="0"/>
+          </a:p>
+        </p:txBody>
+      </p:sp>
+      <p:sp>
+        <p:nvSpPr>
+          <p:cNvPr id="16" name="CuadroTexto 15">
+            <a:extLst>
+              <a:ext uri="{FF2B5EF4-FFF2-40B4-BE49-F238E27FC236}">
+                <a16:creationId xmlns:a16="http://schemas.microsoft.com/office/drawing/2014/main" id="{A3B37CF3-A3C1-EAB6-D103-DCD43D02C88D}"/>
+              </a:ext>
+            </a:extLst>
+          </p:cNvPr>
+          <p:cNvSpPr txBox="1"/>
+          <p:nvPr/>
+        </p:nvSpPr>
+        <p:spPr>
+          <a:xfrm>
+            <a:off x="3250552" y="4540167"/>
+            <a:ext cx="489352" cy="369332"/>
+          </a:xfrm>
+          <a:prstGeom prst="rect">
+            <a:avLst/>
+          </a:prstGeom>
+          <a:noFill/>
+        </p:spPr>
+        <p:txBody>
+          <a:bodyPr wrap="square">
+            <a:spAutoFit/>
+          </a:bodyPr>
+          <a:lstStyle/>
+          <a:p>
+            <a:r>
+              <a:rPr lang="es-ES" b="1" dirty="0"/>
+              <a:t>D.</a:t>
+            </a:r>
+            <a:endParaRPr lang="es-CO" b="1" dirty="0"/>
+          </a:p>
+        </p:txBody>
+      </p:sp>
+      <p:pic>
+        <p:nvPicPr>
+          <p:cNvPr id="3" name="Imagen 2" descr="Imagen que contiene interior, tabla, comida, azul&#10;&#10;Descripción generada automáticamente">
+            <a:extLst>
+              <a:ext uri="{FF2B5EF4-FFF2-40B4-BE49-F238E27FC236}">
+                <a16:creationId xmlns:a16="http://schemas.microsoft.com/office/drawing/2014/main" id="{B579EA72-E420-4226-A273-B0439C31BED8}"/>
+              </a:ext>
+            </a:extLst>
+          </p:cNvPr>
+          <p:cNvPicPr>
+            <a:picLocks noChangeAspect="1"/>
+          </p:cNvPicPr>
+          <p:nvPr/>
+        </p:nvPicPr>
+        <p:blipFill>
+          <a:blip r:embed="rId3">
+            <a:extLst>
+              <a:ext uri="{28A0092B-C50C-407E-A947-70E740481C1C}">
+                <a14:useLocalDpi xmlns:a14="http://schemas.microsoft.com/office/drawing/2010/main" val="0"/>
+              </a:ext>
+            </a:extLst>
+          </a:blip>
+          <a:stretch>
+            <a:fillRect/>
+          </a:stretch>
+        </p:blipFill>
+        <p:spPr>
+          <a:xfrm>
+            <a:off x="218341" y="337353"/>
+            <a:ext cx="3001890" cy="2246727"/>
+          </a:xfrm>
+          <a:prstGeom prst="rect">
+            <a:avLst/>
+          </a:prstGeom>
+          <a:ln>
+            <a:noFill/>
+          </a:ln>
+          <a:effectLst>
+            <a:outerShdw blurRad="292100" dist="139700" dir="2700000" algn="tl" rotWithShape="0">
+              <a:srgbClr val="333333">
+                <a:alpha val="65000"/>
+              </a:srgbClr>
+            </a:outerShdw>
+          </a:effectLst>
+        </p:spPr>
+      </p:pic>
+      <p:pic>
+        <p:nvPicPr>
+          <p:cNvPr id="6" name="Imagen 5" descr="Mesa de madera&#10;&#10;Descripción generada automáticamente con confianza baja">
+            <a:extLst>
+              <a:ext uri="{FF2B5EF4-FFF2-40B4-BE49-F238E27FC236}">
+                <a16:creationId xmlns:a16="http://schemas.microsoft.com/office/drawing/2014/main" id="{407044DA-2F27-4591-9813-2F0CFD833EE8}"/>
+              </a:ext>
+            </a:extLst>
+          </p:cNvPr>
+          <p:cNvPicPr>
+            <a:picLocks noChangeAspect="1"/>
+          </p:cNvPicPr>
+          <p:nvPr/>
+        </p:nvPicPr>
+        <p:blipFill>
+          <a:blip r:embed="rId4">
+            <a:extLst>
+              <a:ext uri="{28A0092B-C50C-407E-A947-70E740481C1C}">
+                <a14:useLocalDpi xmlns:a14="http://schemas.microsoft.com/office/drawing/2010/main" val="0"/>
+              </a:ext>
+            </a:extLst>
+          </a:blip>
+          <a:stretch>
+            <a:fillRect/>
+          </a:stretch>
+        </p:blipFill>
+        <p:spPr>
+          <a:xfrm>
+            <a:off x="592348" y="2829529"/>
+            <a:ext cx="5673304" cy="4246113"/>
+          </a:xfrm>
+          <a:prstGeom prst="rect">
+            <a:avLst/>
+          </a:prstGeom>
+          <a:ln>
+            <a:noFill/>
+          </a:ln>
+          <a:effectLst>
+            <a:outerShdw blurRad="292100" dist="139700" dir="2700000" algn="tl" rotWithShape="0">
+              <a:srgbClr val="333333">
+                <a:alpha val="65000"/>
+              </a:srgbClr>
+            </a:outerShdw>
+          </a:effectLst>
+        </p:spPr>
+      </p:pic>
+      <p:pic>
+        <p:nvPicPr>
+          <p:cNvPr id="10" name="Imagen 9" descr="Una bandeja con alimentos y bebidas&#10;&#10;Descripción generada automáticamente">
+            <a:extLst>
+              <a:ext uri="{FF2B5EF4-FFF2-40B4-BE49-F238E27FC236}">
+                <a16:creationId xmlns:a16="http://schemas.microsoft.com/office/drawing/2014/main" id="{AEE8DBC6-886E-48FE-B27A-ED132D5341D1}"/>
+              </a:ext>
+            </a:extLst>
+          </p:cNvPr>
+          <p:cNvPicPr>
+            <a:picLocks noChangeAspect="1"/>
+          </p:cNvPicPr>
+          <p:nvPr/>
+        </p:nvPicPr>
+        <p:blipFill>
+          <a:blip r:embed="rId5">
+            <a:extLst>
+              <a:ext uri="{28A0092B-C50C-407E-A947-70E740481C1C}">
+                <a14:useLocalDpi xmlns:a14="http://schemas.microsoft.com/office/drawing/2010/main" val="0"/>
+              </a:ext>
+            </a:extLst>
+          </a:blip>
+          <a:stretch>
+            <a:fillRect/>
+          </a:stretch>
+        </p:blipFill>
+        <p:spPr>
+          <a:xfrm>
+            <a:off x="3596602" y="335837"/>
+            <a:ext cx="3054064" cy="2285776"/>
+          </a:xfrm>
+          <a:prstGeom prst="rect">
+            <a:avLst/>
+          </a:prstGeom>
+          <a:ln>
+            <a:noFill/>
+          </a:ln>
+          <a:effectLst>
+            <a:outerShdw blurRad="292100" dist="139700" dir="2700000" algn="tl" rotWithShape="0">
+              <a:srgbClr val="333333">
+                <a:alpha val="65000"/>
+              </a:srgbClr>
+            </a:outerShdw>
+          </a:effectLst>
+        </p:spPr>
+      </p:pic>
+    </p:spTree>
+    <p:extLst>
+      <p:ext uri="{BB962C8B-B14F-4D97-AF65-F5344CB8AC3E}">
+        <p14:creationId xmlns:p14="http://schemas.microsoft.com/office/powerpoint/2010/main" val="1979536991"/>
       </p:ext>
     </p:extLst>
   </p:cSld>

</xml_diff>